<commit_message>
rest of the images for cross validation.
</commit_message>
<xml_diff>
--- a/src/drawings.pptx
+++ b/src/drawings.pptx
@@ -10,6 +10,7 @@
     <p:sldId id="291" r:id="rId4"/>
     <p:sldId id="292" r:id="rId5"/>
     <p:sldId id="289" r:id="rId6"/>
+    <p:sldId id="294" r:id="rId7"/>
   </p:sldIdLst>
   <p:sldSz cx="10972800" cy="10972800"/>
   <p:notesSz cx="6858000" cy="9144000"/>
@@ -293,7 +294,7 @@
             <a:fld id="{195DF5E6-D9CC-0C4D-B162-4D2BDA47E8CD}" type="datetimeFigureOut">
               <a:rPr lang="en-US" smtClean="0"/>
               <a:pPr/>
-              <a:t>5/26/16</a:t>
+              <a:t>6/13/16</a:t>
             </a:fld>
             <a:endParaRPr lang="en-US"/>
           </a:p>
@@ -460,7 +461,7 @@
             <a:fld id="{195DF5E6-D9CC-0C4D-B162-4D2BDA47E8CD}" type="datetimeFigureOut">
               <a:rPr lang="en-US" smtClean="0"/>
               <a:pPr/>
-              <a:t>5/26/16</a:t>
+              <a:t>6/13/16</a:t>
             </a:fld>
             <a:endParaRPr lang="en-US"/>
           </a:p>
@@ -637,7 +638,7 @@
             <a:fld id="{195DF5E6-D9CC-0C4D-B162-4D2BDA47E8CD}" type="datetimeFigureOut">
               <a:rPr lang="en-US" smtClean="0"/>
               <a:pPr/>
-              <a:t>5/26/16</a:t>
+              <a:t>6/13/16</a:t>
             </a:fld>
             <a:endParaRPr lang="en-US"/>
           </a:p>
@@ -804,7 +805,7 @@
             <a:fld id="{195DF5E6-D9CC-0C4D-B162-4D2BDA47E8CD}" type="datetimeFigureOut">
               <a:rPr lang="en-US" smtClean="0"/>
               <a:pPr/>
-              <a:t>5/26/16</a:t>
+              <a:t>6/13/16</a:t>
             </a:fld>
             <a:endParaRPr lang="en-US"/>
           </a:p>
@@ -1047,7 +1048,7 @@
             <a:fld id="{195DF5E6-D9CC-0C4D-B162-4D2BDA47E8CD}" type="datetimeFigureOut">
               <a:rPr lang="en-US" smtClean="0"/>
               <a:pPr/>
-              <a:t>5/26/16</a:t>
+              <a:t>6/13/16</a:t>
             </a:fld>
             <a:endParaRPr lang="en-US"/>
           </a:p>
@@ -1332,7 +1333,7 @@
             <a:fld id="{195DF5E6-D9CC-0C4D-B162-4D2BDA47E8CD}" type="datetimeFigureOut">
               <a:rPr lang="en-US" smtClean="0"/>
               <a:pPr/>
-              <a:t>5/26/16</a:t>
+              <a:t>6/13/16</a:t>
             </a:fld>
             <a:endParaRPr lang="en-US"/>
           </a:p>
@@ -1756,7 +1757,7 @@
             <a:fld id="{195DF5E6-D9CC-0C4D-B162-4D2BDA47E8CD}" type="datetimeFigureOut">
               <a:rPr lang="en-US" smtClean="0"/>
               <a:pPr/>
-              <a:t>5/26/16</a:t>
+              <a:t>6/13/16</a:t>
             </a:fld>
             <a:endParaRPr lang="en-US"/>
           </a:p>
@@ -1871,7 +1872,7 @@
             <a:fld id="{195DF5E6-D9CC-0C4D-B162-4D2BDA47E8CD}" type="datetimeFigureOut">
               <a:rPr lang="en-US" smtClean="0"/>
               <a:pPr/>
-              <a:t>5/26/16</a:t>
+              <a:t>6/13/16</a:t>
             </a:fld>
             <a:endParaRPr lang="en-US"/>
           </a:p>
@@ -1963,7 +1964,7 @@
             <a:fld id="{195DF5E6-D9CC-0C4D-B162-4D2BDA47E8CD}" type="datetimeFigureOut">
               <a:rPr lang="en-US" smtClean="0"/>
               <a:pPr/>
-              <a:t>5/26/16</a:t>
+              <a:t>6/13/16</a:t>
             </a:fld>
             <a:endParaRPr lang="en-US"/>
           </a:p>
@@ -2237,7 +2238,7 @@
             <a:fld id="{195DF5E6-D9CC-0C4D-B162-4D2BDA47E8CD}" type="datetimeFigureOut">
               <a:rPr lang="en-US" smtClean="0"/>
               <a:pPr/>
-              <a:t>5/26/16</a:t>
+              <a:t>6/13/16</a:t>
             </a:fld>
             <a:endParaRPr lang="en-US"/>
           </a:p>
@@ -2487,7 +2488,7 @@
             <a:fld id="{195DF5E6-D9CC-0C4D-B162-4D2BDA47E8CD}" type="datetimeFigureOut">
               <a:rPr lang="en-US" smtClean="0"/>
               <a:pPr/>
-              <a:t>5/26/16</a:t>
+              <a:t>6/13/16</a:t>
             </a:fld>
             <a:endParaRPr lang="en-US"/>
           </a:p>
@@ -2697,7 +2698,7 @@
             <a:fld id="{195DF5E6-D9CC-0C4D-B162-4D2BDA47E8CD}" type="datetimeFigureOut">
               <a:rPr lang="en-US" smtClean="0"/>
               <a:pPr/>
-              <a:t>5/26/16</a:t>
+              <a:t>6/13/16</a:t>
             </a:fld>
             <a:endParaRPr lang="en-US"/>
           </a:p>
@@ -6251,7 +6252,55 @@
             <a:avLst/>
           </a:prstGeom>
           <a:solidFill>
-            <a:schemeClr val="bg1">
+            <a:schemeClr val="accent5">
+              <a:lumMod val="40000"/>
+              <a:lumOff val="60000"/>
+            </a:schemeClr>
+          </a:solidFill>
+          <a:ln w="25400">
+            <a:noFill/>
+          </a:ln>
+          <a:effectLst/>
+        </p:spPr>
+        <p:style>
+          <a:lnRef idx="1">
+            <a:schemeClr val="accent1"/>
+          </a:lnRef>
+          <a:fillRef idx="3">
+            <a:schemeClr val="accent1"/>
+          </a:fillRef>
+          <a:effectRef idx="2">
+            <a:schemeClr val="accent1"/>
+          </a:effectRef>
+          <a:fontRef idx="minor">
+            <a:schemeClr val="lt1"/>
+          </a:fontRef>
+        </p:style>
+        <p:txBody>
+          <a:bodyPr rtlCol="0" anchor="ctr"/>
+          <a:lstStyle/>
+          <a:p>
+            <a:pPr algn="ctr"/>
+            <a:endParaRPr lang="en-US"/>
+          </a:p>
+        </p:txBody>
+      </p:sp>
+      <p:sp>
+        <p:nvSpPr>
+          <p:cNvPr id="33" name="Rectangle 32"/>
+          <p:cNvSpPr/>
+          <p:nvPr/>
+        </p:nvSpPr>
+        <p:spPr>
+          <a:xfrm>
+            <a:off x="1828800" y="3657600"/>
+            <a:ext cx="1051560" cy="914400"/>
+          </a:xfrm>
+          <a:prstGeom prst="rect">
+            <a:avLst/>
+          </a:prstGeom>
+          <a:solidFill>
+            <a:schemeClr val="accent5">
               <a:lumMod val="75000"/>
             </a:schemeClr>
           </a:solidFill>
@@ -6285,68 +6334,22 @@
       </p:sp>
       <p:sp>
         <p:nvSpPr>
-          <p:cNvPr id="33" name="Rectangle 32"/>
+          <p:cNvPr id="34" name="Rectangle 33"/>
           <p:cNvSpPr/>
           <p:nvPr/>
         </p:nvSpPr>
         <p:spPr>
           <a:xfrm>
             <a:off x="1828800" y="3657600"/>
-            <a:ext cx="1051560" cy="914400"/>
+            <a:ext cx="475488" cy="914400"/>
           </a:xfrm>
           <a:prstGeom prst="rect">
             <a:avLst/>
           </a:prstGeom>
           <a:solidFill>
-            <a:schemeClr val="tx1">
-              <a:lumMod val="65000"/>
-              <a:lumOff val="35000"/>
+            <a:schemeClr val="accent5">
+              <a:lumMod val="50000"/>
             </a:schemeClr>
-          </a:solidFill>
-          <a:ln w="25400">
-            <a:noFill/>
-          </a:ln>
-          <a:effectLst/>
-        </p:spPr>
-        <p:style>
-          <a:lnRef idx="1">
-            <a:schemeClr val="accent1"/>
-          </a:lnRef>
-          <a:fillRef idx="3">
-            <a:schemeClr val="accent1"/>
-          </a:fillRef>
-          <a:effectRef idx="2">
-            <a:schemeClr val="accent1"/>
-          </a:effectRef>
-          <a:fontRef idx="minor">
-            <a:schemeClr val="lt1"/>
-          </a:fontRef>
-        </p:style>
-        <p:txBody>
-          <a:bodyPr rtlCol="0" anchor="ctr"/>
-          <a:lstStyle/>
-          <a:p>
-            <a:pPr algn="ctr"/>
-            <a:endParaRPr lang="en-US"/>
-          </a:p>
-        </p:txBody>
-      </p:sp>
-      <p:sp>
-        <p:nvSpPr>
-          <p:cNvPr id="34" name="Rectangle 33"/>
-          <p:cNvSpPr/>
-          <p:nvPr/>
-        </p:nvSpPr>
-        <p:spPr>
-          <a:xfrm>
-            <a:off x="1828800" y="3657600"/>
-            <a:ext cx="475488" cy="914400"/>
-          </a:xfrm>
-          <a:prstGeom prst="rect">
-            <a:avLst/>
-          </a:prstGeom>
-          <a:solidFill>
-            <a:schemeClr val="tx1"/>
           </a:solidFill>
           <a:ln w="25400">
             <a:noFill/>
@@ -6488,7 +6491,35 @@
                 <a:latin typeface="Calibri"/>
                 <a:cs typeface="Calibri"/>
               </a:rPr>
-              <a:t>C++ (4.1 ms)</a:t>
+              <a:t>C++ </a:t>
+            </a:r>
+            <a:r>
+              <a:rPr lang="en-US" sz="2800" dirty="0" smtClean="0">
+                <a:latin typeface="Calibri"/>
+                <a:cs typeface="Calibri"/>
+              </a:rPr>
+              <a:t>(</a:t>
+            </a:r>
+            <a:r>
+              <a:rPr lang="en-US" sz="2800" dirty="0" smtClean="0">
+                <a:latin typeface="Calibri"/>
+                <a:cs typeface="Calibri"/>
+              </a:rPr>
+              <a:t>20</a:t>
+            </a:r>
+            <a:r>
+              <a:rPr lang="en-US" sz="2800" dirty="0" smtClean="0">
+                <a:latin typeface="Calibri"/>
+                <a:cs typeface="Calibri"/>
+              </a:rPr>
+              <a:t> </a:t>
+            </a:r>
+            <a:r>
+              <a:rPr lang="en-US" sz="2800" dirty="0" smtClean="0">
+                <a:latin typeface="Calibri"/>
+                <a:cs typeface="Calibri"/>
+              </a:rPr>
+              <a:t>ms)</a:t>
             </a:r>
           </a:p>
         </p:txBody>
@@ -6559,7 +6590,35 @@
                 <a:latin typeface="Calibri"/>
                 <a:cs typeface="Calibri"/>
               </a:rPr>
-              <a:t>Scala (206 ms)</a:t>
+              <a:t>Scala </a:t>
+            </a:r>
+            <a:r>
+              <a:rPr lang="en-US" sz="2800" dirty="0" smtClean="0">
+                <a:latin typeface="Calibri"/>
+                <a:cs typeface="Calibri"/>
+              </a:rPr>
+              <a:t>(</a:t>
+            </a:r>
+            <a:r>
+              <a:rPr lang="en-US" sz="2800" dirty="0" smtClean="0">
+                <a:latin typeface="Calibri"/>
+                <a:cs typeface="Calibri"/>
+              </a:rPr>
+              <a:t>1097</a:t>
+            </a:r>
+            <a:r>
+              <a:rPr lang="en-US" sz="2800" dirty="0" smtClean="0">
+                <a:latin typeface="Calibri"/>
+                <a:cs typeface="Calibri"/>
+              </a:rPr>
+              <a:t> </a:t>
+            </a:r>
+            <a:r>
+              <a:rPr lang="en-US" sz="2800" dirty="0" smtClean="0">
+                <a:latin typeface="Calibri"/>
+                <a:cs typeface="Calibri"/>
+              </a:rPr>
+              <a:t>ms)</a:t>
             </a:r>
           </a:p>
         </p:txBody>
@@ -6832,14 +6891,16 @@
                 <a:avLst/>
               </a:prstGeom>
               <a:solidFill>
-                <a:schemeClr val="bg1">
-                  <a:lumMod val="75000"/>
+                <a:schemeClr val="accent5">
+                  <a:lumMod val="40000"/>
+                  <a:lumOff val="60000"/>
                 </a:schemeClr>
               </a:solidFill>
               <a:ln w="38100">
                 <a:solidFill>
-                  <a:schemeClr val="bg1">
-                    <a:lumMod val="75000"/>
+                  <a:schemeClr val="accent5">
+                    <a:lumMod val="40000"/>
+                    <a:lumOff val="60000"/>
                   </a:schemeClr>
                 </a:solidFill>
               </a:ln>
@@ -6932,16 +6993,14 @@
                 <a:avLst/>
               </a:prstGeom>
               <a:solidFill>
-                <a:schemeClr val="tx1">
-                  <a:lumMod val="65000"/>
-                  <a:lumOff val="35000"/>
+                <a:schemeClr val="accent5">
+                  <a:lumMod val="75000"/>
                 </a:schemeClr>
               </a:solidFill>
               <a:ln w="38100">
                 <a:solidFill>
-                  <a:schemeClr val="tx1">
-                    <a:lumMod val="65000"/>
-                    <a:lumOff val="35000"/>
+                  <a:schemeClr val="accent5">
+                    <a:lumMod val="75000"/>
                   </a:schemeClr>
                 </a:solidFill>
               </a:ln>
@@ -7034,11 +7093,15 @@
                 <a:avLst/>
               </a:prstGeom>
               <a:solidFill>
-                <a:schemeClr val="tx1"/>
+                <a:schemeClr val="accent5">
+                  <a:lumMod val="50000"/>
+                </a:schemeClr>
               </a:solidFill>
               <a:ln w="38100">
                 <a:solidFill>
-                  <a:schemeClr val="tx1"/>
+                  <a:schemeClr val="accent5">
+                    <a:lumMod val="50000"/>
+                  </a:schemeClr>
                 </a:solidFill>
               </a:ln>
               <a:effectLst/>
@@ -7115,6 +7178,2210 @@
           </a:p>
         </p:txBody>
       </p:sp>
+    </p:spTree>
+  </p:cSld>
+  <p:clrMapOvr>
+    <a:masterClrMapping/>
+  </p:clrMapOvr>
+</p:sld>
+</file>
+
+<file path=ppt/slides/slide6.xml><?xml version="1.0" encoding="utf-8"?>
+<p:sld xmlns:a="http://schemas.openxmlformats.org/drawingml/2006/main" xmlns:r="http://schemas.openxmlformats.org/officeDocument/2006/relationships" xmlns:mc="http://schemas.openxmlformats.org/markup-compatibility/2006" xmlns:mv="urn:schemas-microsoft-com:mac:vml" xmlns:p="http://schemas.openxmlformats.org/presentationml/2006/main" mc:Ignorable="mv" mc:PreserveAttributes="mv:*">
+  <p:cSld>
+    <p:spTree>
+      <p:nvGrpSpPr>
+        <p:cNvPr id="1" name=""/>
+        <p:cNvGrpSpPr/>
+        <p:nvPr/>
+      </p:nvGrpSpPr>
+      <p:grpSpPr>
+        <a:xfrm>
+          <a:off x="0" y="0"/>
+          <a:ext cx="0" cy="0"/>
+          <a:chOff x="0" y="0"/>
+          <a:chExt cx="0" cy="0"/>
+        </a:xfrm>
+      </p:grpSpPr>
+      <p:sp>
+        <p:nvSpPr>
+          <p:cNvPr id="259" name="TextBox 258"/>
+          <p:cNvSpPr txBox="1"/>
+          <p:nvPr/>
+        </p:nvSpPr>
+        <p:spPr>
+          <a:xfrm>
+            <a:off x="206573" y="2182621"/>
+            <a:ext cx="2770350" cy="1200323"/>
+          </a:xfrm>
+          <a:prstGeom prst="rect">
+            <a:avLst/>
+          </a:prstGeom>
+          <a:noFill/>
+        </p:spPr>
+        <p:txBody>
+          <a:bodyPr wrap="square" lIns="91434" tIns="45717" rIns="91434" bIns="45717" rtlCol="0">
+            <a:spAutoFit/>
+          </a:bodyPr>
+          <a:lstStyle/>
+          <a:p>
+            <a:pPr algn="ctr"/>
+            <a:r>
+              <a:rPr lang="en-US" sz="3600" b="1" dirty="0" smtClean="0"/>
+              <a:t>Training</a:t>
+            </a:r>
+          </a:p>
+          <a:p>
+            <a:pPr algn="ctr"/>
+            <a:r>
+              <a:rPr lang="en-US" sz="3600" b="1" dirty="0" smtClean="0"/>
+              <a:t>Data</a:t>
+            </a:r>
+          </a:p>
+        </p:txBody>
+      </p:sp>
+      <p:cxnSp>
+        <p:nvCxnSpPr>
+          <p:cNvPr id="316" name="Straight Arrow Connector 315"/>
+          <p:cNvCxnSpPr>
+            <a:stCxn id="116" idx="1"/>
+            <a:endCxn id="107" idx="3"/>
+          </p:cNvCxnSpPr>
+          <p:nvPr/>
+        </p:nvCxnSpPr>
+        <p:spPr>
+          <a:xfrm rot="10800000">
+            <a:off x="3148318" y="3545994"/>
+            <a:ext cx="548640" cy="961816"/>
+          </a:xfrm>
+          <a:prstGeom prst="straightConnector1">
+            <a:avLst/>
+          </a:prstGeom>
+          <a:ln w="38100" cmpd="sng">
+            <a:solidFill>
+              <a:schemeClr val="tx1"/>
+            </a:solidFill>
+            <a:headEnd type="triangle" w="lg" len="lg"/>
+            <a:tailEnd type="none" w="med" len="med"/>
+          </a:ln>
+          <a:effectLst/>
+        </p:spPr>
+        <p:style>
+          <a:lnRef idx="2">
+            <a:schemeClr val="accent1"/>
+          </a:lnRef>
+          <a:fillRef idx="0">
+            <a:schemeClr val="accent1"/>
+          </a:fillRef>
+          <a:effectRef idx="1">
+            <a:schemeClr val="accent1"/>
+          </a:effectRef>
+          <a:fontRef idx="minor">
+            <a:schemeClr val="tx1"/>
+          </a:fontRef>
+        </p:style>
+      </p:cxnSp>
+      <p:sp>
+        <p:nvSpPr>
+          <p:cNvPr id="107" name="Rounded Rectangle 106"/>
+          <p:cNvSpPr>
+            <a:spLocks/>
+          </p:cNvSpPr>
+          <p:nvPr/>
+        </p:nvSpPr>
+        <p:spPr>
+          <a:xfrm>
+            <a:off x="2508238" y="3317394"/>
+            <a:ext cx="640080" cy="457200"/>
+          </a:xfrm>
+          <a:prstGeom prst="roundRect">
+            <a:avLst/>
+          </a:prstGeom>
+          <a:solidFill>
+            <a:srgbClr val="008000"/>
+          </a:solidFill>
+          <a:ln w="38100">
+            <a:solidFill>
+              <a:schemeClr val="tx1"/>
+            </a:solidFill>
+          </a:ln>
+          <a:effectLst/>
+        </p:spPr>
+        <p:style>
+          <a:lnRef idx="1">
+            <a:schemeClr val="accent1"/>
+          </a:lnRef>
+          <a:fillRef idx="3">
+            <a:schemeClr val="accent1"/>
+          </a:fillRef>
+          <a:effectRef idx="2">
+            <a:schemeClr val="accent1"/>
+          </a:effectRef>
+          <a:fontRef idx="minor">
+            <a:schemeClr val="lt1"/>
+          </a:fontRef>
+        </p:style>
+        <p:txBody>
+          <a:bodyPr rtlCol="0" anchor="ctr"/>
+          <a:lstStyle/>
+          <a:p>
+            <a:pPr algn="ctr"/>
+            <a:endParaRPr lang="en-US"/>
+          </a:p>
+        </p:txBody>
+      </p:sp>
+      <p:sp>
+        <p:nvSpPr>
+          <p:cNvPr id="108" name="Rounded Rectangle 107"/>
+          <p:cNvSpPr>
+            <a:spLocks/>
+          </p:cNvSpPr>
+          <p:nvPr/>
+        </p:nvSpPr>
+        <p:spPr>
+          <a:xfrm>
+            <a:off x="2508238" y="3981182"/>
+            <a:ext cx="640080" cy="457200"/>
+          </a:xfrm>
+          <a:prstGeom prst="roundRect">
+            <a:avLst/>
+          </a:prstGeom>
+          <a:solidFill>
+            <a:srgbClr val="008000"/>
+          </a:solidFill>
+          <a:ln w="38100">
+            <a:solidFill>
+              <a:schemeClr val="tx1"/>
+            </a:solidFill>
+          </a:ln>
+          <a:effectLst/>
+        </p:spPr>
+        <p:style>
+          <a:lnRef idx="1">
+            <a:schemeClr val="accent1"/>
+          </a:lnRef>
+          <a:fillRef idx="3">
+            <a:schemeClr val="accent1"/>
+          </a:fillRef>
+          <a:effectRef idx="2">
+            <a:schemeClr val="accent1"/>
+          </a:effectRef>
+          <a:fontRef idx="minor">
+            <a:schemeClr val="lt1"/>
+          </a:fontRef>
+        </p:style>
+        <p:txBody>
+          <a:bodyPr rtlCol="0" anchor="ctr"/>
+          <a:lstStyle/>
+          <a:p>
+            <a:pPr algn="ctr"/>
+            <a:endParaRPr lang="en-US"/>
+          </a:p>
+        </p:txBody>
+      </p:sp>
+      <p:sp>
+        <p:nvSpPr>
+          <p:cNvPr id="109" name="Rounded Rectangle 108"/>
+          <p:cNvSpPr>
+            <a:spLocks/>
+          </p:cNvSpPr>
+          <p:nvPr/>
+        </p:nvSpPr>
+        <p:spPr>
+          <a:xfrm>
+            <a:off x="2508238" y="4594171"/>
+            <a:ext cx="640080" cy="457200"/>
+          </a:xfrm>
+          <a:prstGeom prst="roundRect">
+            <a:avLst/>
+          </a:prstGeom>
+          <a:solidFill>
+            <a:srgbClr val="008000"/>
+          </a:solidFill>
+          <a:ln w="38100">
+            <a:solidFill>
+              <a:schemeClr val="tx1"/>
+            </a:solidFill>
+          </a:ln>
+          <a:effectLst/>
+        </p:spPr>
+        <p:style>
+          <a:lnRef idx="1">
+            <a:schemeClr val="accent1"/>
+          </a:lnRef>
+          <a:fillRef idx="3">
+            <a:schemeClr val="accent1"/>
+          </a:fillRef>
+          <a:effectRef idx="2">
+            <a:schemeClr val="accent1"/>
+          </a:effectRef>
+          <a:fontRef idx="minor">
+            <a:schemeClr val="lt1"/>
+          </a:fontRef>
+        </p:style>
+        <p:txBody>
+          <a:bodyPr rtlCol="0" anchor="ctr"/>
+          <a:lstStyle/>
+          <a:p>
+            <a:pPr algn="ctr"/>
+            <a:endParaRPr lang="en-US"/>
+          </a:p>
+        </p:txBody>
+      </p:sp>
+      <p:sp>
+        <p:nvSpPr>
+          <p:cNvPr id="110" name="Rounded Rectangle 109"/>
+          <p:cNvSpPr>
+            <a:spLocks/>
+          </p:cNvSpPr>
+          <p:nvPr/>
+        </p:nvSpPr>
+        <p:spPr>
+          <a:xfrm>
+            <a:off x="2508238" y="5241026"/>
+            <a:ext cx="640080" cy="457200"/>
+          </a:xfrm>
+          <a:prstGeom prst="roundRect">
+            <a:avLst/>
+          </a:prstGeom>
+          <a:solidFill>
+            <a:srgbClr val="008000"/>
+          </a:solidFill>
+          <a:ln w="38100">
+            <a:solidFill>
+              <a:schemeClr val="tx1"/>
+            </a:solidFill>
+          </a:ln>
+          <a:effectLst/>
+        </p:spPr>
+        <p:style>
+          <a:lnRef idx="1">
+            <a:schemeClr val="accent1"/>
+          </a:lnRef>
+          <a:fillRef idx="3">
+            <a:schemeClr val="accent1"/>
+          </a:fillRef>
+          <a:effectRef idx="2">
+            <a:schemeClr val="accent1"/>
+          </a:effectRef>
+          <a:fontRef idx="minor">
+            <a:schemeClr val="lt1"/>
+          </a:fontRef>
+        </p:style>
+        <p:txBody>
+          <a:bodyPr rtlCol="0" anchor="ctr"/>
+          <a:lstStyle/>
+          <a:p>
+            <a:pPr algn="ctr"/>
+            <a:endParaRPr lang="en-US"/>
+          </a:p>
+        </p:txBody>
+      </p:sp>
+      <p:sp>
+        <p:nvSpPr>
+          <p:cNvPr id="116" name="Rounded Rectangle 115"/>
+          <p:cNvSpPr>
+            <a:spLocks/>
+          </p:cNvSpPr>
+          <p:nvPr/>
+        </p:nvSpPr>
+        <p:spPr>
+          <a:xfrm>
+            <a:off x="3696958" y="4279210"/>
+            <a:ext cx="640080" cy="457200"/>
+          </a:xfrm>
+          <a:prstGeom prst="roundRect">
+            <a:avLst/>
+          </a:prstGeom>
+          <a:solidFill>
+            <a:srgbClr val="008000"/>
+          </a:solidFill>
+          <a:ln w="38100">
+            <a:solidFill>
+              <a:schemeClr val="tx1"/>
+            </a:solidFill>
+          </a:ln>
+          <a:effectLst/>
+        </p:spPr>
+        <p:style>
+          <a:lnRef idx="1">
+            <a:schemeClr val="accent1"/>
+          </a:lnRef>
+          <a:fillRef idx="3">
+            <a:schemeClr val="accent1"/>
+          </a:fillRef>
+          <a:effectRef idx="2">
+            <a:schemeClr val="accent1"/>
+          </a:effectRef>
+          <a:fontRef idx="minor">
+            <a:schemeClr val="lt1"/>
+          </a:fontRef>
+        </p:style>
+        <p:txBody>
+          <a:bodyPr rtlCol="0" anchor="ctr"/>
+          <a:lstStyle/>
+          <a:p>
+            <a:pPr algn="ctr"/>
+            <a:endParaRPr lang="en-US"/>
+          </a:p>
+        </p:txBody>
+      </p:sp>
+      <p:cxnSp>
+        <p:nvCxnSpPr>
+          <p:cNvPr id="120" name="Straight Arrow Connector 119"/>
+          <p:cNvCxnSpPr>
+            <a:stCxn id="116" idx="1"/>
+            <a:endCxn id="110" idx="3"/>
+          </p:cNvCxnSpPr>
+          <p:nvPr/>
+        </p:nvCxnSpPr>
+        <p:spPr>
+          <a:xfrm rot="10800000" flipV="1">
+            <a:off x="3148318" y="4507810"/>
+            <a:ext cx="548640" cy="961816"/>
+          </a:xfrm>
+          <a:prstGeom prst="straightConnector1">
+            <a:avLst/>
+          </a:prstGeom>
+          <a:ln w="38100" cmpd="sng">
+            <a:solidFill>
+              <a:schemeClr val="tx1"/>
+            </a:solidFill>
+            <a:headEnd type="triangle" w="lg" len="lg"/>
+            <a:tailEnd type="none" w="med" len="med"/>
+          </a:ln>
+          <a:effectLst/>
+        </p:spPr>
+        <p:style>
+          <a:lnRef idx="2">
+            <a:schemeClr val="accent1"/>
+          </a:lnRef>
+          <a:fillRef idx="0">
+            <a:schemeClr val="accent1"/>
+          </a:fillRef>
+          <a:effectRef idx="1">
+            <a:schemeClr val="accent1"/>
+          </a:effectRef>
+          <a:fontRef idx="minor">
+            <a:schemeClr val="tx1"/>
+          </a:fontRef>
+        </p:style>
+      </p:cxnSp>
+      <p:cxnSp>
+        <p:nvCxnSpPr>
+          <p:cNvPr id="121" name="Straight Arrow Connector 120"/>
+          <p:cNvCxnSpPr>
+            <a:stCxn id="116" idx="1"/>
+            <a:endCxn id="109" idx="3"/>
+          </p:cNvCxnSpPr>
+          <p:nvPr/>
+        </p:nvCxnSpPr>
+        <p:spPr>
+          <a:xfrm rot="10800000" flipV="1">
+            <a:off x="3148318" y="4507809"/>
+            <a:ext cx="548640" cy="314961"/>
+          </a:xfrm>
+          <a:prstGeom prst="straightConnector1">
+            <a:avLst/>
+          </a:prstGeom>
+          <a:ln w="38100" cmpd="sng">
+            <a:solidFill>
+              <a:schemeClr val="tx1"/>
+            </a:solidFill>
+            <a:headEnd type="triangle" w="lg" len="lg"/>
+            <a:tailEnd type="none" w="med" len="med"/>
+          </a:ln>
+          <a:effectLst/>
+        </p:spPr>
+        <p:style>
+          <a:lnRef idx="2">
+            <a:schemeClr val="accent1"/>
+          </a:lnRef>
+          <a:fillRef idx="0">
+            <a:schemeClr val="accent1"/>
+          </a:fillRef>
+          <a:effectRef idx="1">
+            <a:schemeClr val="accent1"/>
+          </a:effectRef>
+          <a:fontRef idx="minor">
+            <a:schemeClr val="tx1"/>
+          </a:fontRef>
+        </p:style>
+      </p:cxnSp>
+      <p:cxnSp>
+        <p:nvCxnSpPr>
+          <p:cNvPr id="122" name="Straight Arrow Connector 121"/>
+          <p:cNvCxnSpPr>
+            <a:stCxn id="116" idx="1"/>
+            <a:endCxn id="108" idx="3"/>
+          </p:cNvCxnSpPr>
+          <p:nvPr/>
+        </p:nvCxnSpPr>
+        <p:spPr>
+          <a:xfrm rot="10800000">
+            <a:off x="3148318" y="4209782"/>
+            <a:ext cx="548640" cy="298028"/>
+          </a:xfrm>
+          <a:prstGeom prst="straightConnector1">
+            <a:avLst/>
+          </a:prstGeom>
+          <a:ln w="38100" cmpd="sng">
+            <a:solidFill>
+              <a:schemeClr val="tx1"/>
+            </a:solidFill>
+            <a:headEnd type="triangle" w="lg" len="lg"/>
+            <a:tailEnd type="none" w="med" len="med"/>
+          </a:ln>
+          <a:effectLst/>
+        </p:spPr>
+        <p:style>
+          <a:lnRef idx="2">
+            <a:schemeClr val="accent1"/>
+          </a:lnRef>
+          <a:fillRef idx="0">
+            <a:schemeClr val="accent1"/>
+          </a:fillRef>
+          <a:effectRef idx="1">
+            <a:schemeClr val="accent1"/>
+          </a:effectRef>
+          <a:fontRef idx="minor">
+            <a:schemeClr val="tx1"/>
+          </a:fontRef>
+        </p:style>
+      </p:cxnSp>
+      <p:cxnSp>
+        <p:nvCxnSpPr>
+          <p:cNvPr id="131" name="Straight Arrow Connector 130"/>
+          <p:cNvCxnSpPr>
+            <a:stCxn id="136" idx="1"/>
+            <a:endCxn id="132" idx="3"/>
+          </p:cNvCxnSpPr>
+          <p:nvPr/>
+        </p:nvCxnSpPr>
+        <p:spPr>
+          <a:xfrm rot="10800000">
+            <a:off x="7698589" y="3549172"/>
+            <a:ext cx="548640" cy="961816"/>
+          </a:xfrm>
+          <a:prstGeom prst="straightConnector1">
+            <a:avLst/>
+          </a:prstGeom>
+          <a:ln w="38100" cmpd="sng">
+            <a:solidFill>
+              <a:schemeClr val="tx1"/>
+            </a:solidFill>
+            <a:headEnd type="triangle" w="lg" len="lg"/>
+            <a:tailEnd type="none" w="med" len="med"/>
+          </a:ln>
+          <a:effectLst/>
+        </p:spPr>
+        <p:style>
+          <a:lnRef idx="2">
+            <a:schemeClr val="accent1"/>
+          </a:lnRef>
+          <a:fillRef idx="0">
+            <a:schemeClr val="accent1"/>
+          </a:fillRef>
+          <a:effectRef idx="1">
+            <a:schemeClr val="accent1"/>
+          </a:effectRef>
+          <a:fontRef idx="minor">
+            <a:schemeClr val="tx1"/>
+          </a:fontRef>
+        </p:style>
+      </p:cxnSp>
+      <p:sp>
+        <p:nvSpPr>
+          <p:cNvPr id="132" name="Rounded Rectangle 131"/>
+          <p:cNvSpPr>
+            <a:spLocks/>
+          </p:cNvSpPr>
+          <p:nvPr/>
+        </p:nvSpPr>
+        <p:spPr>
+          <a:xfrm>
+            <a:off x="7058509" y="3320572"/>
+            <a:ext cx="640080" cy="457200"/>
+          </a:xfrm>
+          <a:prstGeom prst="roundRect">
+            <a:avLst/>
+          </a:prstGeom>
+          <a:solidFill>
+            <a:srgbClr val="1DE13A"/>
+          </a:solidFill>
+          <a:ln w="38100">
+            <a:solidFill>
+              <a:schemeClr val="tx1"/>
+            </a:solidFill>
+          </a:ln>
+          <a:effectLst/>
+        </p:spPr>
+        <p:style>
+          <a:lnRef idx="1">
+            <a:schemeClr val="accent1"/>
+          </a:lnRef>
+          <a:fillRef idx="3">
+            <a:schemeClr val="accent1"/>
+          </a:fillRef>
+          <a:effectRef idx="2">
+            <a:schemeClr val="accent1"/>
+          </a:effectRef>
+          <a:fontRef idx="minor">
+            <a:schemeClr val="lt1"/>
+          </a:fontRef>
+        </p:style>
+        <p:txBody>
+          <a:bodyPr rtlCol="0" anchor="ctr"/>
+          <a:lstStyle/>
+          <a:p>
+            <a:pPr algn="ctr"/>
+            <a:endParaRPr lang="en-US"/>
+          </a:p>
+        </p:txBody>
+      </p:sp>
+      <p:sp>
+        <p:nvSpPr>
+          <p:cNvPr id="133" name="Rounded Rectangle 132"/>
+          <p:cNvSpPr>
+            <a:spLocks/>
+          </p:cNvSpPr>
+          <p:nvPr/>
+        </p:nvSpPr>
+        <p:spPr>
+          <a:xfrm>
+            <a:off x="7058509" y="3984360"/>
+            <a:ext cx="640080" cy="457200"/>
+          </a:xfrm>
+          <a:prstGeom prst="roundRect">
+            <a:avLst/>
+          </a:prstGeom>
+          <a:solidFill>
+            <a:srgbClr val="1DE13A"/>
+          </a:solidFill>
+          <a:ln w="38100">
+            <a:solidFill>
+              <a:schemeClr val="tx1"/>
+            </a:solidFill>
+          </a:ln>
+          <a:effectLst/>
+        </p:spPr>
+        <p:style>
+          <a:lnRef idx="1">
+            <a:schemeClr val="accent1"/>
+          </a:lnRef>
+          <a:fillRef idx="3">
+            <a:schemeClr val="accent1"/>
+          </a:fillRef>
+          <a:effectRef idx="2">
+            <a:schemeClr val="accent1"/>
+          </a:effectRef>
+          <a:fontRef idx="minor">
+            <a:schemeClr val="lt1"/>
+          </a:fontRef>
+        </p:style>
+        <p:txBody>
+          <a:bodyPr rtlCol="0" anchor="ctr"/>
+          <a:lstStyle/>
+          <a:p>
+            <a:pPr algn="ctr"/>
+            <a:endParaRPr lang="en-US"/>
+          </a:p>
+        </p:txBody>
+      </p:sp>
+      <p:sp>
+        <p:nvSpPr>
+          <p:cNvPr id="134" name="Rounded Rectangle 133"/>
+          <p:cNvSpPr>
+            <a:spLocks/>
+          </p:cNvSpPr>
+          <p:nvPr/>
+        </p:nvSpPr>
+        <p:spPr>
+          <a:xfrm>
+            <a:off x="7058509" y="4597349"/>
+            <a:ext cx="640080" cy="457200"/>
+          </a:xfrm>
+          <a:prstGeom prst="roundRect">
+            <a:avLst/>
+          </a:prstGeom>
+          <a:solidFill>
+            <a:srgbClr val="1DE13A"/>
+          </a:solidFill>
+          <a:ln w="38100">
+            <a:solidFill>
+              <a:schemeClr val="tx1"/>
+            </a:solidFill>
+          </a:ln>
+          <a:effectLst/>
+        </p:spPr>
+        <p:style>
+          <a:lnRef idx="1">
+            <a:schemeClr val="accent1"/>
+          </a:lnRef>
+          <a:fillRef idx="3">
+            <a:schemeClr val="accent1"/>
+          </a:fillRef>
+          <a:effectRef idx="2">
+            <a:schemeClr val="accent1"/>
+          </a:effectRef>
+          <a:fontRef idx="minor">
+            <a:schemeClr val="lt1"/>
+          </a:fontRef>
+        </p:style>
+        <p:txBody>
+          <a:bodyPr rtlCol="0" anchor="ctr"/>
+          <a:lstStyle/>
+          <a:p>
+            <a:pPr algn="ctr"/>
+            <a:endParaRPr lang="en-US"/>
+          </a:p>
+        </p:txBody>
+      </p:sp>
+      <p:sp>
+        <p:nvSpPr>
+          <p:cNvPr id="135" name="Rounded Rectangle 134"/>
+          <p:cNvSpPr>
+            <a:spLocks/>
+          </p:cNvSpPr>
+          <p:nvPr/>
+        </p:nvSpPr>
+        <p:spPr>
+          <a:xfrm>
+            <a:off x="7058509" y="5244204"/>
+            <a:ext cx="640080" cy="457200"/>
+          </a:xfrm>
+          <a:prstGeom prst="roundRect">
+            <a:avLst/>
+          </a:prstGeom>
+          <a:solidFill>
+            <a:srgbClr val="1DE13A"/>
+          </a:solidFill>
+          <a:ln w="38100">
+            <a:solidFill>
+              <a:schemeClr val="tx1"/>
+            </a:solidFill>
+          </a:ln>
+          <a:effectLst/>
+        </p:spPr>
+        <p:style>
+          <a:lnRef idx="1">
+            <a:schemeClr val="accent1"/>
+          </a:lnRef>
+          <a:fillRef idx="3">
+            <a:schemeClr val="accent1"/>
+          </a:fillRef>
+          <a:effectRef idx="2">
+            <a:schemeClr val="accent1"/>
+          </a:effectRef>
+          <a:fontRef idx="minor">
+            <a:schemeClr val="lt1"/>
+          </a:fontRef>
+        </p:style>
+        <p:txBody>
+          <a:bodyPr rtlCol="0" anchor="ctr"/>
+          <a:lstStyle/>
+          <a:p>
+            <a:pPr algn="ctr"/>
+            <a:endParaRPr lang="en-US"/>
+          </a:p>
+        </p:txBody>
+      </p:sp>
+      <p:sp>
+        <p:nvSpPr>
+          <p:cNvPr id="136" name="Rounded Rectangle 135"/>
+          <p:cNvSpPr>
+            <a:spLocks/>
+          </p:cNvSpPr>
+          <p:nvPr/>
+        </p:nvSpPr>
+        <p:spPr>
+          <a:xfrm>
+            <a:off x="8247229" y="4282388"/>
+            <a:ext cx="640080" cy="457200"/>
+          </a:xfrm>
+          <a:prstGeom prst="roundRect">
+            <a:avLst/>
+          </a:prstGeom>
+          <a:solidFill>
+            <a:srgbClr val="1DE13A"/>
+          </a:solidFill>
+          <a:ln w="38100">
+            <a:solidFill>
+              <a:schemeClr val="tx1"/>
+            </a:solidFill>
+          </a:ln>
+          <a:effectLst/>
+        </p:spPr>
+        <p:style>
+          <a:lnRef idx="1">
+            <a:schemeClr val="accent1"/>
+          </a:lnRef>
+          <a:fillRef idx="3">
+            <a:schemeClr val="accent1"/>
+          </a:fillRef>
+          <a:effectRef idx="2">
+            <a:schemeClr val="accent1"/>
+          </a:effectRef>
+          <a:fontRef idx="minor">
+            <a:schemeClr val="lt1"/>
+          </a:fontRef>
+        </p:style>
+        <p:txBody>
+          <a:bodyPr rtlCol="0" anchor="ctr"/>
+          <a:lstStyle/>
+          <a:p>
+            <a:pPr algn="ctr"/>
+            <a:endParaRPr lang="en-US"/>
+          </a:p>
+        </p:txBody>
+      </p:sp>
+      <p:cxnSp>
+        <p:nvCxnSpPr>
+          <p:cNvPr id="137" name="Straight Arrow Connector 136"/>
+          <p:cNvCxnSpPr>
+            <a:stCxn id="136" idx="1"/>
+            <a:endCxn id="135" idx="3"/>
+          </p:cNvCxnSpPr>
+          <p:nvPr/>
+        </p:nvCxnSpPr>
+        <p:spPr>
+          <a:xfrm rot="10800000" flipV="1">
+            <a:off x="7698589" y="4510988"/>
+            <a:ext cx="548640" cy="961816"/>
+          </a:xfrm>
+          <a:prstGeom prst="straightConnector1">
+            <a:avLst/>
+          </a:prstGeom>
+          <a:ln w="38100" cmpd="sng">
+            <a:solidFill>
+              <a:schemeClr val="tx1"/>
+            </a:solidFill>
+            <a:headEnd type="triangle" w="lg" len="lg"/>
+            <a:tailEnd type="none" w="med" len="med"/>
+          </a:ln>
+          <a:effectLst/>
+        </p:spPr>
+        <p:style>
+          <a:lnRef idx="2">
+            <a:schemeClr val="accent1"/>
+          </a:lnRef>
+          <a:fillRef idx="0">
+            <a:schemeClr val="accent1"/>
+          </a:fillRef>
+          <a:effectRef idx="1">
+            <a:schemeClr val="accent1"/>
+          </a:effectRef>
+          <a:fontRef idx="minor">
+            <a:schemeClr val="tx1"/>
+          </a:fontRef>
+        </p:style>
+      </p:cxnSp>
+      <p:cxnSp>
+        <p:nvCxnSpPr>
+          <p:cNvPr id="138" name="Straight Arrow Connector 137"/>
+          <p:cNvCxnSpPr>
+            <a:stCxn id="136" idx="1"/>
+            <a:endCxn id="134" idx="3"/>
+          </p:cNvCxnSpPr>
+          <p:nvPr/>
+        </p:nvCxnSpPr>
+        <p:spPr>
+          <a:xfrm rot="10800000" flipV="1">
+            <a:off x="7698589" y="4510987"/>
+            <a:ext cx="548640" cy="314961"/>
+          </a:xfrm>
+          <a:prstGeom prst="straightConnector1">
+            <a:avLst/>
+          </a:prstGeom>
+          <a:ln w="38100" cmpd="sng">
+            <a:solidFill>
+              <a:schemeClr val="tx1"/>
+            </a:solidFill>
+            <a:headEnd type="triangle" w="lg" len="lg"/>
+            <a:tailEnd type="none" w="med" len="med"/>
+          </a:ln>
+          <a:effectLst/>
+        </p:spPr>
+        <p:style>
+          <a:lnRef idx="2">
+            <a:schemeClr val="accent1"/>
+          </a:lnRef>
+          <a:fillRef idx="0">
+            <a:schemeClr val="accent1"/>
+          </a:fillRef>
+          <a:effectRef idx="1">
+            <a:schemeClr val="accent1"/>
+          </a:effectRef>
+          <a:fontRef idx="minor">
+            <a:schemeClr val="tx1"/>
+          </a:fontRef>
+        </p:style>
+      </p:cxnSp>
+      <p:cxnSp>
+        <p:nvCxnSpPr>
+          <p:cNvPr id="139" name="Straight Arrow Connector 138"/>
+          <p:cNvCxnSpPr>
+            <a:stCxn id="136" idx="1"/>
+            <a:endCxn id="133" idx="3"/>
+          </p:cNvCxnSpPr>
+          <p:nvPr/>
+        </p:nvCxnSpPr>
+        <p:spPr>
+          <a:xfrm rot="10800000">
+            <a:off x="7698589" y="4212960"/>
+            <a:ext cx="548640" cy="298028"/>
+          </a:xfrm>
+          <a:prstGeom prst="straightConnector1">
+            <a:avLst/>
+          </a:prstGeom>
+          <a:ln w="38100" cmpd="sng">
+            <a:solidFill>
+              <a:schemeClr val="tx1"/>
+            </a:solidFill>
+            <a:headEnd type="triangle" w="lg" len="lg"/>
+            <a:tailEnd type="none" w="med" len="med"/>
+          </a:ln>
+          <a:effectLst/>
+        </p:spPr>
+        <p:style>
+          <a:lnRef idx="2">
+            <a:schemeClr val="accent1"/>
+          </a:lnRef>
+          <a:fillRef idx="0">
+            <a:schemeClr val="accent1"/>
+          </a:fillRef>
+          <a:effectRef idx="1">
+            <a:schemeClr val="accent1"/>
+          </a:effectRef>
+          <a:fontRef idx="minor">
+            <a:schemeClr val="tx1"/>
+          </a:fontRef>
+        </p:style>
+      </p:cxnSp>
+      <p:cxnSp>
+        <p:nvCxnSpPr>
+          <p:cNvPr id="181" name="Straight Arrow Connector 180"/>
+          <p:cNvCxnSpPr>
+            <a:stCxn id="132" idx="1"/>
+            <a:endCxn id="217" idx="6"/>
+          </p:cNvCxnSpPr>
+          <p:nvPr/>
+        </p:nvCxnSpPr>
+        <p:spPr>
+          <a:xfrm rot="10800000" flipV="1">
+            <a:off x="6371163" y="3549171"/>
+            <a:ext cx="687346" cy="1589"/>
+          </a:xfrm>
+          <a:prstGeom prst="straightConnector1">
+            <a:avLst/>
+          </a:prstGeom>
+          <a:ln w="38100" cmpd="sng">
+            <a:solidFill>
+              <a:schemeClr val="tx1"/>
+            </a:solidFill>
+            <a:headEnd type="triangle" w="lg" len="lg"/>
+            <a:tailEnd type="none" w="med" len="med"/>
+          </a:ln>
+          <a:effectLst/>
+        </p:spPr>
+        <p:style>
+          <a:lnRef idx="2">
+            <a:schemeClr val="accent1"/>
+          </a:lnRef>
+          <a:fillRef idx="0">
+            <a:schemeClr val="accent1"/>
+          </a:fillRef>
+          <a:effectRef idx="1">
+            <a:schemeClr val="accent1"/>
+          </a:effectRef>
+          <a:fontRef idx="minor">
+            <a:schemeClr val="tx1"/>
+          </a:fontRef>
+        </p:style>
+      </p:cxnSp>
+      <p:cxnSp>
+        <p:nvCxnSpPr>
+          <p:cNvPr id="185" name="Straight Arrow Connector 184"/>
+          <p:cNvCxnSpPr>
+            <a:stCxn id="133" idx="1"/>
+            <a:endCxn id="218" idx="6"/>
+          </p:cNvCxnSpPr>
+          <p:nvPr/>
+        </p:nvCxnSpPr>
+        <p:spPr>
+          <a:xfrm rot="10800000" flipV="1">
+            <a:off x="6371163" y="4212959"/>
+            <a:ext cx="687346" cy="1589"/>
+          </a:xfrm>
+          <a:prstGeom prst="straightConnector1">
+            <a:avLst/>
+          </a:prstGeom>
+          <a:ln w="38100" cmpd="sng">
+            <a:solidFill>
+              <a:schemeClr val="tx1"/>
+            </a:solidFill>
+            <a:headEnd type="triangle" w="lg" len="lg"/>
+            <a:tailEnd type="none" w="med" len="med"/>
+          </a:ln>
+          <a:effectLst/>
+        </p:spPr>
+        <p:style>
+          <a:lnRef idx="2">
+            <a:schemeClr val="accent1"/>
+          </a:lnRef>
+          <a:fillRef idx="0">
+            <a:schemeClr val="accent1"/>
+          </a:fillRef>
+          <a:effectRef idx="1">
+            <a:schemeClr val="accent1"/>
+          </a:effectRef>
+          <a:fontRef idx="minor">
+            <a:schemeClr val="tx1"/>
+          </a:fontRef>
+        </p:style>
+      </p:cxnSp>
+      <p:cxnSp>
+        <p:nvCxnSpPr>
+          <p:cNvPr id="188" name="Straight Arrow Connector 187"/>
+          <p:cNvCxnSpPr>
+            <a:stCxn id="134" idx="1"/>
+            <a:endCxn id="219" idx="6"/>
+          </p:cNvCxnSpPr>
+          <p:nvPr/>
+        </p:nvCxnSpPr>
+        <p:spPr>
+          <a:xfrm rot="10800000" flipV="1">
+            <a:off x="6371163" y="4825948"/>
+            <a:ext cx="687346" cy="1589"/>
+          </a:xfrm>
+          <a:prstGeom prst="straightConnector1">
+            <a:avLst/>
+          </a:prstGeom>
+          <a:ln w="38100" cmpd="sng">
+            <a:solidFill>
+              <a:schemeClr val="tx1"/>
+            </a:solidFill>
+            <a:headEnd type="triangle" w="lg" len="lg"/>
+            <a:tailEnd type="none" w="med" len="med"/>
+          </a:ln>
+          <a:effectLst/>
+        </p:spPr>
+        <p:style>
+          <a:lnRef idx="2">
+            <a:schemeClr val="accent1"/>
+          </a:lnRef>
+          <a:fillRef idx="0">
+            <a:schemeClr val="accent1"/>
+          </a:fillRef>
+          <a:effectRef idx="1">
+            <a:schemeClr val="accent1"/>
+          </a:effectRef>
+          <a:fontRef idx="minor">
+            <a:schemeClr val="tx1"/>
+          </a:fontRef>
+        </p:style>
+      </p:cxnSp>
+      <p:cxnSp>
+        <p:nvCxnSpPr>
+          <p:cNvPr id="191" name="Straight Arrow Connector 190"/>
+          <p:cNvCxnSpPr>
+            <a:stCxn id="135" idx="1"/>
+            <a:endCxn id="220" idx="6"/>
+          </p:cNvCxnSpPr>
+          <p:nvPr/>
+        </p:nvCxnSpPr>
+        <p:spPr>
+          <a:xfrm rot="10800000">
+            <a:off x="6371163" y="5472804"/>
+            <a:ext cx="687346" cy="1588"/>
+          </a:xfrm>
+          <a:prstGeom prst="straightConnector1">
+            <a:avLst/>
+          </a:prstGeom>
+          <a:ln w="38100" cmpd="sng">
+            <a:solidFill>
+              <a:schemeClr val="tx1"/>
+            </a:solidFill>
+            <a:headEnd type="triangle" w="lg" len="lg"/>
+            <a:tailEnd type="none" w="med" len="med"/>
+          </a:ln>
+          <a:effectLst/>
+        </p:spPr>
+        <p:style>
+          <a:lnRef idx="2">
+            <a:schemeClr val="accent1"/>
+          </a:lnRef>
+          <a:fillRef idx="0">
+            <a:schemeClr val="accent1"/>
+          </a:fillRef>
+          <a:effectRef idx="1">
+            <a:schemeClr val="accent1"/>
+          </a:effectRef>
+          <a:fontRef idx="minor">
+            <a:schemeClr val="tx1"/>
+          </a:fontRef>
+        </p:style>
+      </p:cxnSp>
+      <p:cxnSp>
+        <p:nvCxnSpPr>
+          <p:cNvPr id="198" name="Straight Arrow Connector 197"/>
+          <p:cNvCxnSpPr>
+            <a:stCxn id="107" idx="1"/>
+            <a:endCxn id="209" idx="6"/>
+          </p:cNvCxnSpPr>
+          <p:nvPr/>
+        </p:nvCxnSpPr>
+        <p:spPr>
+          <a:xfrm rot="10800000">
+            <a:off x="1740486" y="3545994"/>
+            <a:ext cx="767753" cy="1"/>
+          </a:xfrm>
+          <a:prstGeom prst="straightConnector1">
+            <a:avLst/>
+          </a:prstGeom>
+          <a:ln w="38100" cmpd="sng">
+            <a:solidFill>
+              <a:schemeClr val="tx1"/>
+            </a:solidFill>
+            <a:headEnd type="triangle" w="lg" len="lg"/>
+            <a:tailEnd type="none" w="med" len="med"/>
+          </a:ln>
+          <a:effectLst/>
+        </p:spPr>
+        <p:style>
+          <a:lnRef idx="2">
+            <a:schemeClr val="accent1"/>
+          </a:lnRef>
+          <a:fillRef idx="0">
+            <a:schemeClr val="accent1"/>
+          </a:fillRef>
+          <a:effectRef idx="1">
+            <a:schemeClr val="accent1"/>
+          </a:effectRef>
+          <a:fontRef idx="minor">
+            <a:schemeClr val="tx1"/>
+          </a:fontRef>
+        </p:style>
+      </p:cxnSp>
+      <p:cxnSp>
+        <p:nvCxnSpPr>
+          <p:cNvPr id="199" name="Straight Arrow Connector 198"/>
+          <p:cNvCxnSpPr>
+            <a:stCxn id="108" idx="1"/>
+            <a:endCxn id="210" idx="6"/>
+          </p:cNvCxnSpPr>
+          <p:nvPr/>
+        </p:nvCxnSpPr>
+        <p:spPr>
+          <a:xfrm rot="10800000">
+            <a:off x="1740486" y="4209782"/>
+            <a:ext cx="767753" cy="1"/>
+          </a:xfrm>
+          <a:prstGeom prst="straightConnector1">
+            <a:avLst/>
+          </a:prstGeom>
+          <a:ln w="38100" cmpd="sng">
+            <a:solidFill>
+              <a:schemeClr val="tx1"/>
+            </a:solidFill>
+            <a:headEnd type="triangle" w="lg" len="lg"/>
+            <a:tailEnd type="none" w="med" len="med"/>
+          </a:ln>
+          <a:effectLst/>
+        </p:spPr>
+        <p:style>
+          <a:lnRef idx="2">
+            <a:schemeClr val="accent1"/>
+          </a:lnRef>
+          <a:fillRef idx="0">
+            <a:schemeClr val="accent1"/>
+          </a:fillRef>
+          <a:effectRef idx="1">
+            <a:schemeClr val="accent1"/>
+          </a:effectRef>
+          <a:fontRef idx="minor">
+            <a:schemeClr val="tx1"/>
+          </a:fontRef>
+        </p:style>
+      </p:cxnSp>
+      <p:cxnSp>
+        <p:nvCxnSpPr>
+          <p:cNvPr id="200" name="Straight Arrow Connector 199"/>
+          <p:cNvCxnSpPr>
+            <a:stCxn id="109" idx="1"/>
+            <a:endCxn id="211" idx="6"/>
+          </p:cNvCxnSpPr>
+          <p:nvPr/>
+        </p:nvCxnSpPr>
+        <p:spPr>
+          <a:xfrm rot="10800000">
+            <a:off x="1740486" y="4822771"/>
+            <a:ext cx="767753" cy="1"/>
+          </a:xfrm>
+          <a:prstGeom prst="straightConnector1">
+            <a:avLst/>
+          </a:prstGeom>
+          <a:ln w="38100" cmpd="sng">
+            <a:solidFill>
+              <a:schemeClr val="tx1"/>
+            </a:solidFill>
+            <a:headEnd type="triangle" w="lg" len="lg"/>
+            <a:tailEnd type="none" w="med" len="med"/>
+          </a:ln>
+          <a:effectLst/>
+        </p:spPr>
+        <p:style>
+          <a:lnRef idx="2">
+            <a:schemeClr val="accent1"/>
+          </a:lnRef>
+          <a:fillRef idx="0">
+            <a:schemeClr val="accent1"/>
+          </a:fillRef>
+          <a:effectRef idx="1">
+            <a:schemeClr val="accent1"/>
+          </a:effectRef>
+          <a:fontRef idx="minor">
+            <a:schemeClr val="tx1"/>
+          </a:fontRef>
+        </p:style>
+      </p:cxnSp>
+      <p:cxnSp>
+        <p:nvCxnSpPr>
+          <p:cNvPr id="201" name="Straight Arrow Connector 200"/>
+          <p:cNvCxnSpPr>
+            <a:stCxn id="110" idx="1"/>
+            <a:endCxn id="212" idx="6"/>
+          </p:cNvCxnSpPr>
+          <p:nvPr/>
+        </p:nvCxnSpPr>
+        <p:spPr>
+          <a:xfrm rot="10800000">
+            <a:off x="1740486" y="5468036"/>
+            <a:ext cx="767753" cy="1590"/>
+          </a:xfrm>
+          <a:prstGeom prst="straightConnector1">
+            <a:avLst/>
+          </a:prstGeom>
+          <a:ln w="38100" cmpd="sng">
+            <a:solidFill>
+              <a:schemeClr val="tx1"/>
+            </a:solidFill>
+            <a:headEnd type="triangle" w="lg" len="lg"/>
+            <a:tailEnd type="none" w="med" len="med"/>
+          </a:ln>
+          <a:effectLst/>
+        </p:spPr>
+        <p:style>
+          <a:lnRef idx="2">
+            <a:schemeClr val="accent1"/>
+          </a:lnRef>
+          <a:fillRef idx="0">
+            <a:schemeClr val="accent1"/>
+          </a:fillRef>
+          <a:effectRef idx="1">
+            <a:schemeClr val="accent1"/>
+          </a:effectRef>
+          <a:fontRef idx="minor">
+            <a:schemeClr val="tx1"/>
+          </a:fontRef>
+        </p:style>
+      </p:cxnSp>
+      <p:sp>
+        <p:nvSpPr>
+          <p:cNvPr id="209" name="Oval 208"/>
+          <p:cNvSpPr>
+            <a:spLocks noChangeAspect="1"/>
+          </p:cNvSpPr>
+          <p:nvPr/>
+        </p:nvSpPr>
+        <p:spPr>
+          <a:xfrm>
+            <a:off x="1283285" y="3317393"/>
+            <a:ext cx="457200" cy="457200"/>
+          </a:xfrm>
+          <a:prstGeom prst="ellipse">
+            <a:avLst/>
+          </a:prstGeom>
+          <a:solidFill>
+            <a:srgbClr val="008000"/>
+          </a:solidFill>
+          <a:ln w="38100">
+            <a:solidFill>
+              <a:schemeClr val="tx1"/>
+            </a:solidFill>
+          </a:ln>
+          <a:effectLst/>
+        </p:spPr>
+        <p:style>
+          <a:lnRef idx="1">
+            <a:schemeClr val="accent1"/>
+          </a:lnRef>
+          <a:fillRef idx="3">
+            <a:schemeClr val="accent1"/>
+          </a:fillRef>
+          <a:effectRef idx="2">
+            <a:schemeClr val="accent1"/>
+          </a:effectRef>
+          <a:fontRef idx="minor">
+            <a:schemeClr val="lt1"/>
+          </a:fontRef>
+        </p:style>
+        <p:txBody>
+          <a:bodyPr rtlCol="0" anchor="ctr"/>
+          <a:lstStyle/>
+          <a:p>
+            <a:pPr algn="ctr"/>
+            <a:endParaRPr lang="en-US"/>
+          </a:p>
+        </p:txBody>
+      </p:sp>
+      <p:sp>
+        <p:nvSpPr>
+          <p:cNvPr id="210" name="Oval 209"/>
+          <p:cNvSpPr>
+            <a:spLocks noChangeAspect="1"/>
+          </p:cNvSpPr>
+          <p:nvPr/>
+        </p:nvSpPr>
+        <p:spPr>
+          <a:xfrm>
+            <a:off x="1283285" y="3981181"/>
+            <a:ext cx="457200" cy="457200"/>
+          </a:xfrm>
+          <a:prstGeom prst="ellipse">
+            <a:avLst/>
+          </a:prstGeom>
+          <a:solidFill>
+            <a:srgbClr val="008000"/>
+          </a:solidFill>
+          <a:ln w="38100">
+            <a:solidFill>
+              <a:schemeClr val="tx1"/>
+            </a:solidFill>
+          </a:ln>
+          <a:effectLst/>
+        </p:spPr>
+        <p:style>
+          <a:lnRef idx="1">
+            <a:schemeClr val="accent1"/>
+          </a:lnRef>
+          <a:fillRef idx="3">
+            <a:schemeClr val="accent1"/>
+          </a:fillRef>
+          <a:effectRef idx="2">
+            <a:schemeClr val="accent1"/>
+          </a:effectRef>
+          <a:fontRef idx="minor">
+            <a:schemeClr val="lt1"/>
+          </a:fontRef>
+        </p:style>
+        <p:txBody>
+          <a:bodyPr rtlCol="0" anchor="ctr"/>
+          <a:lstStyle/>
+          <a:p>
+            <a:pPr algn="ctr"/>
+            <a:endParaRPr lang="en-US"/>
+          </a:p>
+        </p:txBody>
+      </p:sp>
+      <p:sp>
+        <p:nvSpPr>
+          <p:cNvPr id="211" name="Oval 210"/>
+          <p:cNvSpPr>
+            <a:spLocks noChangeAspect="1"/>
+          </p:cNvSpPr>
+          <p:nvPr/>
+        </p:nvSpPr>
+        <p:spPr>
+          <a:xfrm>
+            <a:off x="1283285" y="4594170"/>
+            <a:ext cx="457200" cy="457200"/>
+          </a:xfrm>
+          <a:prstGeom prst="ellipse">
+            <a:avLst/>
+          </a:prstGeom>
+          <a:solidFill>
+            <a:srgbClr val="008000"/>
+          </a:solidFill>
+          <a:ln w="38100">
+            <a:solidFill>
+              <a:schemeClr val="tx1"/>
+            </a:solidFill>
+          </a:ln>
+          <a:effectLst/>
+        </p:spPr>
+        <p:style>
+          <a:lnRef idx="1">
+            <a:schemeClr val="accent1"/>
+          </a:lnRef>
+          <a:fillRef idx="3">
+            <a:schemeClr val="accent1"/>
+          </a:fillRef>
+          <a:effectRef idx="2">
+            <a:schemeClr val="accent1"/>
+          </a:effectRef>
+          <a:fontRef idx="minor">
+            <a:schemeClr val="lt1"/>
+          </a:fontRef>
+        </p:style>
+        <p:txBody>
+          <a:bodyPr rtlCol="0" anchor="ctr"/>
+          <a:lstStyle/>
+          <a:p>
+            <a:pPr algn="ctr"/>
+            <a:endParaRPr lang="en-US"/>
+          </a:p>
+        </p:txBody>
+      </p:sp>
+      <p:sp>
+        <p:nvSpPr>
+          <p:cNvPr id="212" name="Oval 211"/>
+          <p:cNvSpPr>
+            <a:spLocks noChangeAspect="1"/>
+          </p:cNvSpPr>
+          <p:nvPr/>
+        </p:nvSpPr>
+        <p:spPr>
+          <a:xfrm>
+            <a:off x="1283285" y="5239436"/>
+            <a:ext cx="457200" cy="457200"/>
+          </a:xfrm>
+          <a:prstGeom prst="ellipse">
+            <a:avLst/>
+          </a:prstGeom>
+          <a:solidFill>
+            <a:srgbClr val="008000"/>
+          </a:solidFill>
+          <a:ln w="38100">
+            <a:solidFill>
+              <a:schemeClr val="tx1"/>
+            </a:solidFill>
+          </a:ln>
+          <a:effectLst/>
+        </p:spPr>
+        <p:style>
+          <a:lnRef idx="1">
+            <a:schemeClr val="accent1"/>
+          </a:lnRef>
+          <a:fillRef idx="3">
+            <a:schemeClr val="accent1"/>
+          </a:fillRef>
+          <a:effectRef idx="2">
+            <a:schemeClr val="accent1"/>
+          </a:effectRef>
+          <a:fontRef idx="minor">
+            <a:schemeClr val="lt1"/>
+          </a:fontRef>
+        </p:style>
+        <p:txBody>
+          <a:bodyPr rtlCol="0" anchor="ctr"/>
+          <a:lstStyle/>
+          <a:p>
+            <a:pPr algn="ctr"/>
+            <a:endParaRPr lang="en-US"/>
+          </a:p>
+        </p:txBody>
+      </p:sp>
+      <p:sp>
+        <p:nvSpPr>
+          <p:cNvPr id="217" name="Oval 216"/>
+          <p:cNvSpPr>
+            <a:spLocks noChangeAspect="1"/>
+          </p:cNvSpPr>
+          <p:nvPr/>
+        </p:nvSpPr>
+        <p:spPr>
+          <a:xfrm>
+            <a:off x="5913963" y="3322161"/>
+            <a:ext cx="457200" cy="457200"/>
+          </a:xfrm>
+          <a:prstGeom prst="ellipse">
+            <a:avLst/>
+          </a:prstGeom>
+          <a:solidFill>
+            <a:srgbClr val="1DE13A"/>
+          </a:solidFill>
+          <a:ln w="38100">
+            <a:solidFill>
+              <a:schemeClr val="tx1"/>
+            </a:solidFill>
+          </a:ln>
+          <a:effectLst/>
+        </p:spPr>
+        <p:style>
+          <a:lnRef idx="1">
+            <a:schemeClr val="accent1"/>
+          </a:lnRef>
+          <a:fillRef idx="3">
+            <a:schemeClr val="accent1"/>
+          </a:fillRef>
+          <a:effectRef idx="2">
+            <a:schemeClr val="accent1"/>
+          </a:effectRef>
+          <a:fontRef idx="minor">
+            <a:schemeClr val="lt1"/>
+          </a:fontRef>
+        </p:style>
+        <p:txBody>
+          <a:bodyPr rtlCol="0" anchor="ctr"/>
+          <a:lstStyle/>
+          <a:p>
+            <a:pPr algn="ctr"/>
+            <a:endParaRPr lang="en-US"/>
+          </a:p>
+        </p:txBody>
+      </p:sp>
+      <p:sp>
+        <p:nvSpPr>
+          <p:cNvPr id="218" name="Oval 217"/>
+          <p:cNvSpPr>
+            <a:spLocks noChangeAspect="1"/>
+          </p:cNvSpPr>
+          <p:nvPr/>
+        </p:nvSpPr>
+        <p:spPr>
+          <a:xfrm>
+            <a:off x="5913963" y="3985949"/>
+            <a:ext cx="457200" cy="457200"/>
+          </a:xfrm>
+          <a:prstGeom prst="ellipse">
+            <a:avLst/>
+          </a:prstGeom>
+          <a:solidFill>
+            <a:srgbClr val="1DE13A"/>
+          </a:solidFill>
+          <a:ln w="38100">
+            <a:solidFill>
+              <a:schemeClr val="tx1"/>
+            </a:solidFill>
+          </a:ln>
+          <a:effectLst/>
+        </p:spPr>
+        <p:style>
+          <a:lnRef idx="1">
+            <a:schemeClr val="accent1"/>
+          </a:lnRef>
+          <a:fillRef idx="3">
+            <a:schemeClr val="accent1"/>
+          </a:fillRef>
+          <a:effectRef idx="2">
+            <a:schemeClr val="accent1"/>
+          </a:effectRef>
+          <a:fontRef idx="minor">
+            <a:schemeClr val="lt1"/>
+          </a:fontRef>
+        </p:style>
+        <p:txBody>
+          <a:bodyPr rtlCol="0" anchor="ctr"/>
+          <a:lstStyle/>
+          <a:p>
+            <a:pPr algn="ctr"/>
+            <a:endParaRPr lang="en-US"/>
+          </a:p>
+        </p:txBody>
+      </p:sp>
+      <p:sp>
+        <p:nvSpPr>
+          <p:cNvPr id="219" name="Oval 218"/>
+          <p:cNvSpPr>
+            <a:spLocks noChangeAspect="1"/>
+          </p:cNvSpPr>
+          <p:nvPr/>
+        </p:nvSpPr>
+        <p:spPr>
+          <a:xfrm>
+            <a:off x="5913963" y="4598938"/>
+            <a:ext cx="457200" cy="457200"/>
+          </a:xfrm>
+          <a:prstGeom prst="ellipse">
+            <a:avLst/>
+          </a:prstGeom>
+          <a:solidFill>
+            <a:srgbClr val="1DE13A"/>
+          </a:solidFill>
+          <a:ln w="38100">
+            <a:solidFill>
+              <a:schemeClr val="tx1"/>
+            </a:solidFill>
+          </a:ln>
+          <a:effectLst/>
+        </p:spPr>
+        <p:style>
+          <a:lnRef idx="1">
+            <a:schemeClr val="accent1"/>
+          </a:lnRef>
+          <a:fillRef idx="3">
+            <a:schemeClr val="accent1"/>
+          </a:fillRef>
+          <a:effectRef idx="2">
+            <a:schemeClr val="accent1"/>
+          </a:effectRef>
+          <a:fontRef idx="minor">
+            <a:schemeClr val="lt1"/>
+          </a:fontRef>
+        </p:style>
+        <p:txBody>
+          <a:bodyPr rtlCol="0" anchor="ctr"/>
+          <a:lstStyle/>
+          <a:p>
+            <a:pPr algn="ctr"/>
+            <a:endParaRPr lang="en-US"/>
+          </a:p>
+        </p:txBody>
+      </p:sp>
+      <p:sp>
+        <p:nvSpPr>
+          <p:cNvPr id="220" name="Oval 219"/>
+          <p:cNvSpPr>
+            <a:spLocks noChangeAspect="1"/>
+          </p:cNvSpPr>
+          <p:nvPr/>
+        </p:nvSpPr>
+        <p:spPr>
+          <a:xfrm>
+            <a:off x="5913963" y="5244204"/>
+            <a:ext cx="457200" cy="457200"/>
+          </a:xfrm>
+          <a:prstGeom prst="ellipse">
+            <a:avLst/>
+          </a:prstGeom>
+          <a:solidFill>
+            <a:srgbClr val="1DE13A"/>
+          </a:solidFill>
+          <a:ln w="38100">
+            <a:solidFill>
+              <a:schemeClr val="tx1"/>
+            </a:solidFill>
+          </a:ln>
+          <a:effectLst/>
+        </p:spPr>
+        <p:style>
+          <a:lnRef idx="1">
+            <a:schemeClr val="accent1"/>
+          </a:lnRef>
+          <a:fillRef idx="3">
+            <a:schemeClr val="accent1"/>
+          </a:fillRef>
+          <a:effectRef idx="2">
+            <a:schemeClr val="accent1"/>
+          </a:effectRef>
+          <a:fontRef idx="minor">
+            <a:schemeClr val="lt1"/>
+          </a:fontRef>
+        </p:style>
+        <p:txBody>
+          <a:bodyPr rtlCol="0" anchor="ctr"/>
+          <a:lstStyle/>
+          <a:p>
+            <a:pPr algn="ctr"/>
+            <a:endParaRPr lang="en-US"/>
+          </a:p>
+        </p:txBody>
+      </p:sp>
+      <p:sp>
+        <p:nvSpPr>
+          <p:cNvPr id="226" name="TextBox 225"/>
+          <p:cNvSpPr txBox="1"/>
+          <p:nvPr/>
+        </p:nvSpPr>
+        <p:spPr>
+          <a:xfrm>
+            <a:off x="4492747" y="2182621"/>
+            <a:ext cx="3284173" cy="1200323"/>
+          </a:xfrm>
+          <a:prstGeom prst="rect">
+            <a:avLst/>
+          </a:prstGeom>
+          <a:noFill/>
+        </p:spPr>
+        <p:txBody>
+          <a:bodyPr wrap="square" lIns="91434" tIns="45717" rIns="91434" bIns="45717" rtlCol="0">
+            <a:spAutoFit/>
+          </a:bodyPr>
+          <a:lstStyle/>
+          <a:p>
+            <a:pPr algn="ctr"/>
+            <a:r>
+              <a:rPr lang="en-US" sz="3600" b="1" dirty="0" smtClean="0"/>
+              <a:t>Estimation</a:t>
+            </a:r>
+          </a:p>
+          <a:p>
+            <a:pPr algn="ctr"/>
+            <a:r>
+              <a:rPr lang="en-US" sz="3600" b="1" dirty="0" smtClean="0"/>
+              <a:t>Data</a:t>
+            </a:r>
+          </a:p>
+        </p:txBody>
+      </p:sp>
+      <p:sp>
+        <p:nvSpPr>
+          <p:cNvPr id="248" name="TextBox 247"/>
+          <p:cNvSpPr txBox="1"/>
+          <p:nvPr/>
+        </p:nvSpPr>
+        <p:spPr>
+          <a:xfrm rot="16200000">
+            <a:off x="7834887" y="4215815"/>
+            <a:ext cx="3169913" cy="646325"/>
+          </a:xfrm>
+          <a:prstGeom prst="rect">
+            <a:avLst/>
+          </a:prstGeom>
+          <a:noFill/>
+        </p:spPr>
+        <p:txBody>
+          <a:bodyPr wrap="square" lIns="91434" tIns="45717" rIns="91434" bIns="45717" rtlCol="0">
+            <a:spAutoFit/>
+          </a:bodyPr>
+          <a:lstStyle/>
+          <a:p>
+            <a:pPr algn="ctr"/>
+            <a:r>
+              <a:rPr lang="en-US" sz="3600" b="1" dirty="0" smtClean="0"/>
+              <a:t>Parameters</a:t>
+            </a:r>
+          </a:p>
+        </p:txBody>
+      </p:sp>
+      <p:sp>
+        <p:nvSpPr>
+          <p:cNvPr id="95" name="TextBox 94"/>
+          <p:cNvSpPr txBox="1"/>
+          <p:nvPr/>
+        </p:nvSpPr>
+        <p:spPr>
+          <a:xfrm>
+            <a:off x="5792693" y="6226145"/>
+            <a:ext cx="3571440" cy="646325"/>
+          </a:xfrm>
+          <a:prstGeom prst="rect">
+            <a:avLst/>
+          </a:prstGeom>
+          <a:noFill/>
+        </p:spPr>
+        <p:txBody>
+          <a:bodyPr wrap="square" lIns="91434" tIns="45717" rIns="91434" bIns="45717" rtlCol="0">
+            <a:spAutoFit/>
+          </a:bodyPr>
+          <a:lstStyle/>
+          <a:p>
+            <a:pPr algn="ctr"/>
+            <a:r>
+              <a:rPr lang="en-US" sz="3600" b="1" dirty="0" smtClean="0"/>
+              <a:t>Error Estimation</a:t>
+            </a:r>
+            <a:endParaRPr lang="en-US" sz="3200" b="1" dirty="0" smtClean="0"/>
+          </a:p>
+        </p:txBody>
+      </p:sp>
+      <p:sp>
+        <p:nvSpPr>
+          <p:cNvPr id="103" name="TextBox 102"/>
+          <p:cNvSpPr txBox="1"/>
+          <p:nvPr/>
+        </p:nvSpPr>
+        <p:spPr>
+          <a:xfrm>
+            <a:off x="1452624" y="6217920"/>
+            <a:ext cx="3950610" cy="646325"/>
+          </a:xfrm>
+          <a:prstGeom prst="rect">
+            <a:avLst/>
+          </a:prstGeom>
+          <a:noFill/>
+        </p:spPr>
+        <p:txBody>
+          <a:bodyPr wrap="square" lIns="91434" tIns="45717" rIns="91434" bIns="45717" rtlCol="0">
+            <a:spAutoFit/>
+          </a:bodyPr>
+          <a:lstStyle/>
+          <a:p>
+            <a:pPr algn="ctr"/>
+            <a:r>
+              <a:rPr lang="en-US" sz="3600" b="1" dirty="0" smtClean="0"/>
+              <a:t>Iterative Optimizer</a:t>
+            </a:r>
+            <a:endParaRPr lang="en-US" sz="3200" b="1" dirty="0" smtClean="0"/>
+          </a:p>
+        </p:txBody>
+      </p:sp>
+      <p:grpSp>
+        <p:nvGrpSpPr>
+          <p:cNvPr id="2" name="Group 67"/>
+          <p:cNvGrpSpPr/>
+          <p:nvPr/>
+        </p:nvGrpSpPr>
+        <p:grpSpPr>
+          <a:xfrm>
+            <a:off x="2139736" y="4504633"/>
+            <a:ext cx="2422334" cy="1697941"/>
+            <a:chOff x="2139736" y="4403035"/>
+            <a:chExt cx="2422334" cy="1697941"/>
+          </a:xfrm>
+        </p:grpSpPr>
+        <p:cxnSp>
+          <p:nvCxnSpPr>
+            <p:cNvPr id="51" name="Straight Arrow Connector 50"/>
+            <p:cNvCxnSpPr/>
+            <p:nvPr/>
+          </p:nvCxnSpPr>
+          <p:spPr>
+            <a:xfrm rot="5400000">
+              <a:off x="1868982" y="5827044"/>
+              <a:ext cx="543096" cy="1588"/>
+            </a:xfrm>
+            <a:prstGeom prst="straightConnector1">
+              <a:avLst/>
+            </a:prstGeom>
+            <a:ln w="38100" cmpd="sng">
+              <a:solidFill>
+                <a:schemeClr val="tx1"/>
+              </a:solidFill>
+              <a:headEnd type="triangle" w="lg" len="lg"/>
+              <a:tailEnd type="none" w="med" len="med"/>
+            </a:ln>
+            <a:effectLst/>
+          </p:spPr>
+          <p:style>
+            <a:lnRef idx="2">
+              <a:schemeClr val="accent1"/>
+            </a:lnRef>
+            <a:fillRef idx="0">
+              <a:schemeClr val="accent1"/>
+            </a:fillRef>
+            <a:effectRef idx="1">
+              <a:schemeClr val="accent1"/>
+            </a:effectRef>
+            <a:fontRef idx="minor">
+              <a:schemeClr val="tx1"/>
+            </a:fontRef>
+          </p:style>
+        </p:cxnSp>
+        <p:cxnSp>
+          <p:nvCxnSpPr>
+            <p:cNvPr id="57" name="Straight Arrow Connector 56"/>
+            <p:cNvCxnSpPr/>
+            <p:nvPr/>
+          </p:nvCxnSpPr>
+          <p:spPr>
+            <a:xfrm rot="10800000" flipV="1">
+              <a:off x="2141325" y="6099386"/>
+              <a:ext cx="2420745" cy="3"/>
+            </a:xfrm>
+            <a:prstGeom prst="straightConnector1">
+              <a:avLst/>
+            </a:prstGeom>
+            <a:ln w="38100" cmpd="sng">
+              <a:solidFill>
+                <a:schemeClr val="tx1"/>
+              </a:solidFill>
+              <a:headEnd type="none" w="lg" len="lg"/>
+              <a:tailEnd type="none" w="med" len="med"/>
+            </a:ln>
+            <a:effectLst/>
+          </p:spPr>
+          <p:style>
+            <a:lnRef idx="2">
+              <a:schemeClr val="accent1"/>
+            </a:lnRef>
+            <a:fillRef idx="0">
+              <a:schemeClr val="accent1"/>
+            </a:fillRef>
+            <a:effectRef idx="1">
+              <a:schemeClr val="accent1"/>
+            </a:effectRef>
+            <a:fontRef idx="minor">
+              <a:schemeClr val="tx1"/>
+            </a:fontRef>
+          </p:style>
+        </p:cxnSp>
+        <p:cxnSp>
+          <p:nvCxnSpPr>
+            <p:cNvPr id="58" name="Straight Arrow Connector 57"/>
+            <p:cNvCxnSpPr/>
+            <p:nvPr/>
+          </p:nvCxnSpPr>
+          <p:spPr>
+            <a:xfrm rot="16200000" flipH="1">
+              <a:off x="3711509" y="5252005"/>
+              <a:ext cx="1697941" cy="1"/>
+            </a:xfrm>
+            <a:prstGeom prst="straightConnector1">
+              <a:avLst/>
+            </a:prstGeom>
+            <a:ln w="38100" cmpd="sng">
+              <a:solidFill>
+                <a:schemeClr val="tx1"/>
+              </a:solidFill>
+              <a:headEnd type="none" w="lg" len="lg"/>
+              <a:tailEnd type="none" w="med" len="med"/>
+            </a:ln>
+            <a:effectLst/>
+          </p:spPr>
+          <p:style>
+            <a:lnRef idx="2">
+              <a:schemeClr val="accent1"/>
+            </a:lnRef>
+            <a:fillRef idx="0">
+              <a:schemeClr val="accent1"/>
+            </a:fillRef>
+            <a:effectRef idx="1">
+              <a:schemeClr val="accent1"/>
+            </a:effectRef>
+            <a:fontRef idx="minor">
+              <a:schemeClr val="tx1"/>
+            </a:fontRef>
+          </p:style>
+        </p:cxnSp>
+      </p:grpSp>
+      <p:cxnSp>
+        <p:nvCxnSpPr>
+          <p:cNvPr id="70" name="Straight Arrow Connector 69"/>
+          <p:cNvCxnSpPr/>
+          <p:nvPr/>
+        </p:nvCxnSpPr>
+        <p:spPr>
+          <a:xfrm rot="10800000">
+            <a:off x="5284111" y="4506220"/>
+            <a:ext cx="540043" cy="1588"/>
+          </a:xfrm>
+          <a:prstGeom prst="straightConnector1">
+            <a:avLst/>
+          </a:prstGeom>
+          <a:ln w="38100" cmpd="sng">
+            <a:solidFill>
+              <a:schemeClr val="tx1"/>
+            </a:solidFill>
+            <a:headEnd type="triangle" w="lg" len="lg"/>
+            <a:tailEnd type="none" w="med" len="med"/>
+          </a:ln>
+          <a:effectLst/>
+        </p:spPr>
+        <p:style>
+          <a:lnRef idx="2">
+            <a:schemeClr val="accent1"/>
+          </a:lnRef>
+          <a:fillRef idx="0">
+            <a:schemeClr val="accent1"/>
+          </a:fillRef>
+          <a:effectRef idx="1">
+            <a:schemeClr val="accent1"/>
+          </a:effectRef>
+          <a:fontRef idx="minor">
+            <a:schemeClr val="tx1"/>
+          </a:fontRef>
+        </p:style>
+      </p:cxnSp>
+      <p:grpSp>
+        <p:nvGrpSpPr>
+          <p:cNvPr id="3" name="Group 73"/>
+          <p:cNvGrpSpPr/>
+          <p:nvPr/>
+        </p:nvGrpSpPr>
+        <p:grpSpPr>
+          <a:xfrm>
+            <a:off x="603365" y="4510992"/>
+            <a:ext cx="9675168" cy="2596792"/>
+            <a:chOff x="2139736" y="4066872"/>
+            <a:chExt cx="2422334" cy="2034105"/>
+          </a:xfrm>
+        </p:grpSpPr>
+        <p:cxnSp>
+          <p:nvCxnSpPr>
+            <p:cNvPr id="75" name="Straight Arrow Connector 74"/>
+            <p:cNvCxnSpPr/>
+            <p:nvPr/>
+          </p:nvCxnSpPr>
+          <p:spPr>
+            <a:xfrm rot="5400000">
+              <a:off x="1868982" y="5827044"/>
+              <a:ext cx="543096" cy="1588"/>
+            </a:xfrm>
+            <a:prstGeom prst="straightConnector1">
+              <a:avLst/>
+            </a:prstGeom>
+            <a:ln w="38100" cmpd="sng">
+              <a:solidFill>
+                <a:schemeClr val="tx1"/>
+              </a:solidFill>
+              <a:headEnd type="triangle" w="lg" len="lg"/>
+              <a:tailEnd type="none" w="med" len="med"/>
+            </a:ln>
+            <a:effectLst/>
+          </p:spPr>
+          <p:style>
+            <a:lnRef idx="2">
+              <a:schemeClr val="accent1"/>
+            </a:lnRef>
+            <a:fillRef idx="0">
+              <a:schemeClr val="accent1"/>
+            </a:fillRef>
+            <a:effectRef idx="1">
+              <a:schemeClr val="accent1"/>
+            </a:effectRef>
+            <a:fontRef idx="minor">
+              <a:schemeClr val="tx1"/>
+            </a:fontRef>
+          </p:style>
+        </p:cxnSp>
+        <p:cxnSp>
+          <p:nvCxnSpPr>
+            <p:cNvPr id="76" name="Straight Arrow Connector 75"/>
+            <p:cNvCxnSpPr/>
+            <p:nvPr/>
+          </p:nvCxnSpPr>
+          <p:spPr>
+            <a:xfrm rot="10800000" flipV="1">
+              <a:off x="2141325" y="6099386"/>
+              <a:ext cx="2420745" cy="3"/>
+            </a:xfrm>
+            <a:prstGeom prst="straightConnector1">
+              <a:avLst/>
+            </a:prstGeom>
+            <a:ln w="38100" cmpd="sng">
+              <a:solidFill>
+                <a:schemeClr val="tx1"/>
+              </a:solidFill>
+              <a:headEnd type="none" w="lg" len="lg"/>
+              <a:tailEnd type="none" w="med" len="med"/>
+            </a:ln>
+            <a:effectLst/>
+          </p:spPr>
+          <p:style>
+            <a:lnRef idx="2">
+              <a:schemeClr val="accent1"/>
+            </a:lnRef>
+            <a:fillRef idx="0">
+              <a:schemeClr val="accent1"/>
+            </a:fillRef>
+            <a:effectRef idx="1">
+              <a:schemeClr val="accent1"/>
+            </a:effectRef>
+            <a:fontRef idx="minor">
+              <a:schemeClr val="tx1"/>
+            </a:fontRef>
+          </p:style>
+        </p:cxnSp>
+        <p:cxnSp>
+          <p:nvCxnSpPr>
+            <p:cNvPr id="77" name="Straight Arrow Connector 76"/>
+            <p:cNvCxnSpPr/>
+            <p:nvPr/>
+          </p:nvCxnSpPr>
+          <p:spPr>
+            <a:xfrm rot="5400000">
+              <a:off x="3544222" y="5083130"/>
+              <a:ext cx="2034105" cy="1590"/>
+            </a:xfrm>
+            <a:prstGeom prst="straightConnector1">
+              <a:avLst/>
+            </a:prstGeom>
+            <a:ln w="38100" cmpd="sng">
+              <a:solidFill>
+                <a:schemeClr val="tx1"/>
+              </a:solidFill>
+              <a:headEnd type="none" w="lg" len="lg"/>
+              <a:tailEnd type="none" w="med" len="med"/>
+            </a:ln>
+            <a:effectLst/>
+          </p:spPr>
+          <p:style>
+            <a:lnRef idx="2">
+              <a:schemeClr val="accent1"/>
+            </a:lnRef>
+            <a:fillRef idx="0">
+              <a:schemeClr val="accent1"/>
+            </a:fillRef>
+            <a:effectRef idx="1">
+              <a:schemeClr val="accent1"/>
+            </a:effectRef>
+            <a:fontRef idx="minor">
+              <a:schemeClr val="tx1"/>
+            </a:fontRef>
+          </p:style>
+        </p:cxnSp>
+      </p:grpSp>
+      <p:sp>
+        <p:nvSpPr>
+          <p:cNvPr id="78" name="TextBox 77"/>
+          <p:cNvSpPr txBox="1"/>
+          <p:nvPr/>
+        </p:nvSpPr>
+        <p:spPr>
+          <a:xfrm>
+            <a:off x="2508238" y="7062924"/>
+            <a:ext cx="6119758" cy="646325"/>
+          </a:xfrm>
+          <a:prstGeom prst="rect">
+            <a:avLst/>
+          </a:prstGeom>
+          <a:noFill/>
+        </p:spPr>
+        <p:txBody>
+          <a:bodyPr wrap="square" lIns="91434" tIns="45717" rIns="91434" bIns="45717" rtlCol="0">
+            <a:spAutoFit/>
+          </a:bodyPr>
+          <a:lstStyle/>
+          <a:p>
+            <a:pPr algn="ctr"/>
+            <a:r>
+              <a:rPr lang="en-US" sz="3600" b="1" dirty="0" smtClean="0"/>
+              <a:t>Iterative Model Selection</a:t>
+            </a:r>
+            <a:endParaRPr lang="en-US" sz="3200" b="1" dirty="0" smtClean="0"/>
+          </a:p>
+        </p:txBody>
+      </p:sp>
+      <p:cxnSp>
+        <p:nvCxnSpPr>
+          <p:cNvPr id="79" name="Straight Arrow Connector 78"/>
+          <p:cNvCxnSpPr>
+            <a:endCxn id="116" idx="3"/>
+          </p:cNvCxnSpPr>
+          <p:nvPr/>
+        </p:nvCxnSpPr>
+        <p:spPr>
+          <a:xfrm rot="10800000" flipV="1">
+            <a:off x="4337038" y="4507808"/>
+            <a:ext cx="438162" cy="2"/>
+          </a:xfrm>
+          <a:prstGeom prst="straightConnector1">
+            <a:avLst/>
+          </a:prstGeom>
+          <a:ln w="38100" cmpd="sng">
+            <a:solidFill>
+              <a:schemeClr val="tx1"/>
+            </a:solidFill>
+            <a:headEnd type="none" w="lg" len="lg"/>
+            <a:tailEnd type="none" w="med" len="med"/>
+          </a:ln>
+          <a:effectLst/>
+        </p:spPr>
+        <p:style>
+          <a:lnRef idx="2">
+            <a:schemeClr val="accent1"/>
+          </a:lnRef>
+          <a:fillRef idx="0">
+            <a:schemeClr val="accent1"/>
+          </a:fillRef>
+          <a:effectRef idx="1">
+            <a:schemeClr val="accent1"/>
+          </a:effectRef>
+          <a:fontRef idx="minor">
+            <a:schemeClr val="tx1"/>
+          </a:fontRef>
+        </p:style>
+      </p:cxnSp>
+      <p:sp>
+        <p:nvSpPr>
+          <p:cNvPr id="94" name="TextBox 93"/>
+          <p:cNvSpPr txBox="1"/>
+          <p:nvPr/>
+        </p:nvSpPr>
+        <p:spPr>
+          <a:xfrm rot="16200000">
+            <a:off x="3359429" y="4192052"/>
+            <a:ext cx="3169913" cy="646325"/>
+          </a:xfrm>
+          <a:prstGeom prst="rect">
+            <a:avLst/>
+          </a:prstGeom>
+          <a:noFill/>
+        </p:spPr>
+        <p:txBody>
+          <a:bodyPr wrap="square" lIns="91434" tIns="45717" rIns="91434" bIns="45717" rtlCol="0">
+            <a:spAutoFit/>
+          </a:bodyPr>
+          <a:lstStyle/>
+          <a:p>
+            <a:pPr algn="ctr"/>
+            <a:r>
+              <a:rPr lang="en-US" sz="3600" b="1" dirty="0" smtClean="0"/>
+              <a:t>Coefficients</a:t>
+            </a:r>
+          </a:p>
+        </p:txBody>
+      </p:sp>
+      <p:cxnSp>
+        <p:nvCxnSpPr>
+          <p:cNvPr id="97" name="Straight Arrow Connector 96"/>
+          <p:cNvCxnSpPr>
+            <a:endCxn id="136" idx="3"/>
+          </p:cNvCxnSpPr>
+          <p:nvPr/>
+        </p:nvCxnSpPr>
+        <p:spPr>
+          <a:xfrm rot="10800000">
+            <a:off x="8887309" y="4510989"/>
+            <a:ext cx="362524" cy="1"/>
+          </a:xfrm>
+          <a:prstGeom prst="straightConnector1">
+            <a:avLst/>
+          </a:prstGeom>
+          <a:ln w="38100" cmpd="sng">
+            <a:solidFill>
+              <a:schemeClr val="tx1"/>
+            </a:solidFill>
+            <a:headEnd type="none" w="lg" len="lg"/>
+            <a:tailEnd type="none" w="med" len="med"/>
+          </a:ln>
+          <a:effectLst/>
+        </p:spPr>
+        <p:style>
+          <a:lnRef idx="2">
+            <a:schemeClr val="accent1"/>
+          </a:lnRef>
+          <a:fillRef idx="0">
+            <a:schemeClr val="accent1"/>
+          </a:fillRef>
+          <a:effectRef idx="1">
+            <a:schemeClr val="accent1"/>
+          </a:effectRef>
+          <a:fontRef idx="minor">
+            <a:schemeClr val="tx1"/>
+          </a:fontRef>
+        </p:style>
+      </p:cxnSp>
+      <p:cxnSp>
+        <p:nvCxnSpPr>
+          <p:cNvPr id="117" name="Straight Arrow Connector 116"/>
+          <p:cNvCxnSpPr/>
+          <p:nvPr/>
+        </p:nvCxnSpPr>
+        <p:spPr>
+          <a:xfrm rot="10800000">
+            <a:off x="9647473" y="4504632"/>
+            <a:ext cx="631060" cy="1588"/>
+          </a:xfrm>
+          <a:prstGeom prst="straightConnector1">
+            <a:avLst/>
+          </a:prstGeom>
+          <a:ln w="38100" cmpd="sng">
+            <a:solidFill>
+              <a:schemeClr val="tx1"/>
+            </a:solidFill>
+            <a:headEnd type="none" w="lg" len="lg"/>
+            <a:tailEnd type="none" w="med" len="med"/>
+          </a:ln>
+          <a:effectLst/>
+        </p:spPr>
+        <p:style>
+          <a:lnRef idx="2">
+            <a:schemeClr val="accent1"/>
+          </a:lnRef>
+          <a:fillRef idx="0">
+            <a:schemeClr val="accent1"/>
+          </a:fillRef>
+          <a:effectRef idx="1">
+            <a:schemeClr val="accent1"/>
+          </a:effectRef>
+          <a:fontRef idx="minor">
+            <a:schemeClr val="tx1"/>
+          </a:fontRef>
+        </p:style>
+      </p:cxnSp>
     </p:spTree>
   </p:cSld>
   <p:clrMapOvr>

</xml_diff>